<commit_message>
ajout de personnes dans l'image
</commit_message>
<xml_diff>
--- a/microservices/illus.pptx
+++ b/microservices/illus.pptx
@@ -12127,30 +12127,6 @@
           </a:p>
         </p:txBody>
       </p:sp>
-      <p:pic>
-        <p:nvPicPr>
-          <p:cNvPr id="110" name="Image 109"/>
-          <p:cNvPicPr>
-            <a:picLocks noChangeAspect="1"/>
-          </p:cNvPicPr>
-          <p:nvPr/>
-        </p:nvPicPr>
-        <p:blipFill>
-          <a:blip r:embed="rId2"/>
-          <a:stretch>
-            <a:fillRect/>
-          </a:stretch>
-        </p:blipFill>
-        <p:spPr>
-          <a:xfrm>
-            <a:off x="1197066" y="2345547"/>
-            <a:ext cx="227331" cy="240020"/>
-          </a:xfrm>
-          <a:prstGeom prst="rect">
-            <a:avLst/>
-          </a:prstGeom>
-        </p:spPr>
-      </p:pic>
       <p:sp>
         <p:nvSpPr>
           <p:cNvPr id="44" name="Rectangle à coins arrondis 43"/>
@@ -12223,7 +12199,7 @@
           <p:nvPr/>
         </p:nvPicPr>
         <p:blipFill>
-          <a:blip r:embed="rId3">
+          <a:blip r:embed="rId2">
             <a:extLst>
               <a:ext uri="{28A0092B-C50C-407E-A947-70E740481C1C}">
                 <a14:useLocalDpi xmlns:a14="http://schemas.microsoft.com/office/drawing/2010/main" val="0"/>
@@ -12236,7 +12212,7 @@
         </p:blipFill>
         <p:spPr>
           <a:xfrm>
-            <a:off x="1429469" y="2075252"/>
+            <a:off x="1524509" y="2075252"/>
             <a:ext cx="298419" cy="510315"/>
           </a:xfrm>
           <a:prstGeom prst="rect">
@@ -12253,7 +12229,7 @@
           <p:nvPr/>
         </p:nvPicPr>
         <p:blipFill>
-          <a:blip r:embed="rId3">
+          <a:blip r:embed="rId2">
             <a:extLst>
               <a:ext uri="{28A0092B-C50C-407E-A947-70E740481C1C}">
                 <a14:useLocalDpi xmlns:a14="http://schemas.microsoft.com/office/drawing/2010/main" val="0"/>
@@ -12283,7 +12259,7 @@
           <p:nvPr/>
         </p:nvPicPr>
         <p:blipFill>
-          <a:blip r:embed="rId3">
+          <a:blip r:embed="rId2">
             <a:extLst>
               <a:ext uri="{28A0092B-C50C-407E-A947-70E740481C1C}">
                 <a14:useLocalDpi xmlns:a14="http://schemas.microsoft.com/office/drawing/2010/main" val="0"/>
@@ -12313,7 +12289,7 @@
           <p:nvPr/>
         </p:nvPicPr>
         <p:blipFill>
-          <a:blip r:embed="rId3">
+          <a:blip r:embed="rId2">
             <a:extLst>
               <a:ext uri="{28A0092B-C50C-407E-A947-70E740481C1C}">
                 <a14:useLocalDpi xmlns:a14="http://schemas.microsoft.com/office/drawing/2010/main" val="0"/>
@@ -12326,7 +12302,7 @@
         </p:blipFill>
         <p:spPr>
           <a:xfrm>
-            <a:off x="3275614" y="3850231"/>
+            <a:off x="3275614" y="3871836"/>
             <a:ext cx="298419" cy="510315"/>
           </a:xfrm>
           <a:prstGeom prst="rect">
@@ -12343,7 +12319,7 @@
           <p:nvPr/>
         </p:nvPicPr>
         <p:blipFill>
-          <a:blip r:embed="rId3">
+          <a:blip r:embed="rId2">
             <a:extLst>
               <a:ext uri="{28A0092B-C50C-407E-A947-70E740481C1C}">
                 <a14:useLocalDpi xmlns:a14="http://schemas.microsoft.com/office/drawing/2010/main" val="0"/>
@@ -12356,7 +12332,7 @@
         </p:blipFill>
         <p:spPr>
           <a:xfrm>
-            <a:off x="3710692" y="2075689"/>
+            <a:off x="3658852" y="2075689"/>
             <a:ext cx="298419" cy="510315"/>
           </a:xfrm>
           <a:prstGeom prst="rect">
@@ -12375,8 +12351,8 @@
         </p:nvCxnSpPr>
         <p:spPr bwMode="auto">
           <a:xfrm flipH="1" flipV="1">
-            <a:off x="1578679" y="2585567"/>
-            <a:ext cx="1250097" cy="630893"/>
+            <a:off x="1673719" y="2585567"/>
+            <a:ext cx="1155057" cy="630893"/>
           </a:xfrm>
           <a:prstGeom prst="straightConnector1">
             <a:avLst/>
@@ -12449,8 +12425,8 @@
         </p:nvCxnSpPr>
         <p:spPr bwMode="auto">
           <a:xfrm flipH="1" flipV="1">
-            <a:off x="1727888" y="2330410"/>
-            <a:ext cx="1982804" cy="437"/>
+            <a:off x="1822928" y="2330410"/>
+            <a:ext cx="1835924" cy="437"/>
           </a:xfrm>
           <a:prstGeom prst="straightConnector1">
             <a:avLst/>
@@ -12486,8 +12462,8 @@
         </p:nvCxnSpPr>
         <p:spPr bwMode="auto">
           <a:xfrm flipH="1" flipV="1">
-            <a:off x="1578679" y="2585567"/>
-            <a:ext cx="376055" cy="1109698"/>
+            <a:off x="1673719" y="2585567"/>
+            <a:ext cx="281015" cy="1109698"/>
           </a:xfrm>
           <a:prstGeom prst="straightConnector1">
             <a:avLst/>
@@ -12523,7 +12499,7 @@
         <p:spPr bwMode="auto">
           <a:xfrm flipH="1" flipV="1">
             <a:off x="2977986" y="3471617"/>
-            <a:ext cx="446838" cy="378614"/>
+            <a:ext cx="446838" cy="400219"/>
           </a:xfrm>
           <a:prstGeom prst="straightConnector1">
             <a:avLst/>
@@ -12551,13 +12527,16 @@
       <p:cxnSp>
         <p:nvCxnSpPr>
           <p:cNvPr id="73" name="Connecteur droit avec flèche 72"/>
-          <p:cNvCxnSpPr/>
+          <p:cNvCxnSpPr>
+            <a:stCxn id="53" idx="0"/>
+            <a:endCxn id="59" idx="1"/>
+          </p:cNvCxnSpPr>
           <p:nvPr/>
         </p:nvCxnSpPr>
         <p:spPr bwMode="auto">
           <a:xfrm flipV="1">
-            <a:off x="2977986" y="2326360"/>
-            <a:ext cx="732706" cy="634942"/>
+            <a:off x="2977986" y="2330847"/>
+            <a:ext cx="680866" cy="630455"/>
           </a:xfrm>
           <a:prstGeom prst="straightConnector1">
             <a:avLst/>
@@ -12591,7 +12570,7 @@
           <p:nvPr/>
         </p:nvPicPr>
         <p:blipFill>
-          <a:blip r:embed="rId3">
+          <a:blip r:embed="rId2">
             <a:extLst>
               <a:ext uri="{28A0092B-C50C-407E-A947-70E740481C1C}">
                 <a14:useLocalDpi xmlns:a14="http://schemas.microsoft.com/office/drawing/2010/main" val="0"/>
@@ -12621,7 +12600,7 @@
           <p:nvPr/>
         </p:nvPicPr>
         <p:blipFill>
-          <a:blip r:embed="rId3">
+          <a:blip r:embed="rId2">
             <a:extLst>
               <a:ext uri="{28A0092B-C50C-407E-A947-70E740481C1C}">
                 <a14:useLocalDpi xmlns:a14="http://schemas.microsoft.com/office/drawing/2010/main" val="0"/>
@@ -12651,7 +12630,7 @@
           <p:nvPr/>
         </p:nvPicPr>
         <p:blipFill>
-          <a:blip r:embed="rId3">
+          <a:blip r:embed="rId2">
             <a:extLst>
               <a:ext uri="{28A0092B-C50C-407E-A947-70E740481C1C}">
                 <a14:useLocalDpi xmlns:a14="http://schemas.microsoft.com/office/drawing/2010/main" val="0"/>
@@ -12681,7 +12660,7 @@
           <p:nvPr/>
         </p:nvPicPr>
         <p:blipFill>
-          <a:blip r:embed="rId3">
+          <a:blip r:embed="rId2">
             <a:extLst>
               <a:ext uri="{28A0092B-C50C-407E-A947-70E740481C1C}">
                 <a14:useLocalDpi xmlns:a14="http://schemas.microsoft.com/office/drawing/2010/main" val="0"/>
@@ -12711,7 +12690,7 @@
           <p:nvPr/>
         </p:nvPicPr>
         <p:blipFill>
-          <a:blip r:embed="rId3">
+          <a:blip r:embed="rId2">
             <a:extLst>
               <a:ext uri="{28A0092B-C50C-407E-A947-70E740481C1C}">
                 <a14:useLocalDpi xmlns:a14="http://schemas.microsoft.com/office/drawing/2010/main" val="0"/>
@@ -12963,7 +12942,7 @@
           <p:nvPr/>
         </p:nvPicPr>
         <p:blipFill>
-          <a:blip r:embed="rId3">
+          <a:blip r:embed="rId2">
             <a:extLst>
               <a:ext uri="{28A0092B-C50C-407E-A947-70E740481C1C}">
                 <a14:useLocalDpi xmlns:a14="http://schemas.microsoft.com/office/drawing/2010/main" val="0"/>
@@ -12993,7 +12972,7 @@
           <p:nvPr/>
         </p:nvPicPr>
         <p:blipFill>
-          <a:blip r:embed="rId3">
+          <a:blip r:embed="rId2">
             <a:extLst>
               <a:ext uri="{28A0092B-C50C-407E-A947-70E740481C1C}">
                 <a14:useLocalDpi xmlns:a14="http://schemas.microsoft.com/office/drawing/2010/main" val="0"/>
@@ -13023,7 +13002,7 @@
           <p:nvPr/>
         </p:nvPicPr>
         <p:blipFill>
-          <a:blip r:embed="rId3">
+          <a:blip r:embed="rId2">
             <a:extLst>
               <a:ext uri="{28A0092B-C50C-407E-A947-70E740481C1C}">
                 <a14:useLocalDpi xmlns:a14="http://schemas.microsoft.com/office/drawing/2010/main" val="0"/>
@@ -13053,7 +13032,7 @@
           <p:nvPr/>
         </p:nvPicPr>
         <p:blipFill>
-          <a:blip r:embed="rId3">
+          <a:blip r:embed="rId2">
             <a:extLst>
               <a:ext uri="{28A0092B-C50C-407E-A947-70E740481C1C}">
                 <a14:useLocalDpi xmlns:a14="http://schemas.microsoft.com/office/drawing/2010/main" val="0"/>
@@ -13083,7 +13062,7 @@
           <p:nvPr/>
         </p:nvPicPr>
         <p:blipFill>
-          <a:blip r:embed="rId3">
+          <a:blip r:embed="rId2">
             <a:extLst>
               <a:ext uri="{28A0092B-C50C-407E-A947-70E740481C1C}">
                 <a14:useLocalDpi xmlns:a14="http://schemas.microsoft.com/office/drawing/2010/main" val="0"/>
@@ -13113,7 +13092,7 @@
           <p:nvPr/>
         </p:nvPicPr>
         <p:blipFill>
-          <a:blip r:embed="rId3">
+          <a:blip r:embed="rId2">
             <a:extLst>
               <a:ext uri="{28A0092B-C50C-407E-A947-70E740481C1C}">
                 <a14:useLocalDpi xmlns:a14="http://schemas.microsoft.com/office/drawing/2010/main" val="0"/>
@@ -13512,7 +13491,7 @@
           <p:nvPr/>
         </p:nvPicPr>
         <p:blipFill>
-          <a:blip r:embed="rId3">
+          <a:blip r:embed="rId2">
             <a:extLst>
               <a:ext uri="{28A0092B-C50C-407E-A947-70E740481C1C}">
                 <a14:useLocalDpi xmlns:a14="http://schemas.microsoft.com/office/drawing/2010/main" val="0"/>
@@ -13542,7 +13521,7 @@
           <p:nvPr/>
         </p:nvPicPr>
         <p:blipFill>
-          <a:blip r:embed="rId3">
+          <a:blip r:embed="rId2">
             <a:extLst>
               <a:ext uri="{28A0092B-C50C-407E-A947-70E740481C1C}">
                 <a14:useLocalDpi xmlns:a14="http://schemas.microsoft.com/office/drawing/2010/main" val="0"/>
@@ -13572,7 +13551,7 @@
           <p:nvPr/>
         </p:nvPicPr>
         <p:blipFill>
-          <a:blip r:embed="rId3">
+          <a:blip r:embed="rId2">
             <a:extLst>
               <a:ext uri="{28A0092B-C50C-407E-A947-70E740481C1C}">
                 <a14:useLocalDpi xmlns:a14="http://schemas.microsoft.com/office/drawing/2010/main" val="0"/>
@@ -13780,102 +13759,6 @@
       </p:cxnSp>
       <p:pic>
         <p:nvPicPr>
-          <p:cNvPr id="112" name="Image 111"/>
-          <p:cNvPicPr>
-            <a:picLocks noChangeAspect="1"/>
-          </p:cNvPicPr>
-          <p:nvPr/>
-        </p:nvPicPr>
-        <p:blipFill>
-          <a:blip r:embed="rId2"/>
-          <a:stretch>
-            <a:fillRect/>
-          </a:stretch>
-        </p:blipFill>
-        <p:spPr>
-          <a:xfrm>
-            <a:off x="1575791" y="3965560"/>
-            <a:ext cx="227331" cy="240020"/>
-          </a:xfrm>
-          <a:prstGeom prst="rect">
-            <a:avLst/>
-          </a:prstGeom>
-        </p:spPr>
-      </p:pic>
-      <p:pic>
-        <p:nvPicPr>
-          <p:cNvPr id="113" name="Image 112"/>
-          <p:cNvPicPr>
-            <a:picLocks noChangeAspect="1"/>
-          </p:cNvPicPr>
-          <p:nvPr/>
-        </p:nvPicPr>
-        <p:blipFill>
-          <a:blip r:embed="rId2"/>
-          <a:stretch>
-            <a:fillRect/>
-          </a:stretch>
-        </p:blipFill>
-        <p:spPr>
-          <a:xfrm>
-            <a:off x="4009111" y="2345984"/>
-            <a:ext cx="227331" cy="240020"/>
-          </a:xfrm>
-          <a:prstGeom prst="rect">
-            <a:avLst/>
-          </a:prstGeom>
-        </p:spPr>
-      </p:pic>
-      <p:pic>
-        <p:nvPicPr>
-          <p:cNvPr id="114" name="Image 113"/>
-          <p:cNvPicPr>
-            <a:picLocks noChangeAspect="1"/>
-          </p:cNvPicPr>
-          <p:nvPr/>
-        </p:nvPicPr>
-        <p:blipFill>
-          <a:blip r:embed="rId2"/>
-          <a:stretch>
-            <a:fillRect/>
-          </a:stretch>
-        </p:blipFill>
-        <p:spPr>
-          <a:xfrm>
-            <a:off x="3122123" y="3231597"/>
-            <a:ext cx="227331" cy="240020"/>
-          </a:xfrm>
-          <a:prstGeom prst="rect">
-            <a:avLst/>
-          </a:prstGeom>
-        </p:spPr>
-      </p:pic>
-      <p:pic>
-        <p:nvPicPr>
-          <p:cNvPr id="115" name="Image 114"/>
-          <p:cNvPicPr>
-            <a:picLocks noChangeAspect="1"/>
-          </p:cNvPicPr>
-          <p:nvPr/>
-        </p:nvPicPr>
-        <p:blipFill>
-          <a:blip r:embed="rId2"/>
-          <a:stretch>
-            <a:fillRect/>
-          </a:stretch>
-        </p:blipFill>
-        <p:spPr>
-          <a:xfrm>
-            <a:off x="3574033" y="4120526"/>
-            <a:ext cx="227331" cy="240020"/>
-          </a:xfrm>
-          <a:prstGeom prst="rect">
-            <a:avLst/>
-          </a:prstGeom>
-        </p:spPr>
-      </p:pic>
-      <p:pic>
-        <p:nvPicPr>
           <p:cNvPr id="117" name="Image 116"/>
           <p:cNvPicPr>
             <a:picLocks noChangeAspect="1"/>
@@ -13883,7 +13766,7 @@
           <p:nvPr/>
         </p:nvPicPr>
         <p:blipFill>
-          <a:blip r:embed="rId2"/>
+          <a:blip r:embed="rId3"/>
           <a:stretch>
             <a:fillRect/>
           </a:stretch>
@@ -13907,7 +13790,7 @@
           <p:nvPr/>
         </p:nvPicPr>
         <p:blipFill>
-          <a:blip r:embed="rId2"/>
+          <a:blip r:embed="rId3"/>
           <a:stretch>
             <a:fillRect/>
           </a:stretch>
@@ -13931,7 +13814,7 @@
           <p:nvPr/>
         </p:nvPicPr>
         <p:blipFill>
-          <a:blip r:embed="rId2"/>
+          <a:blip r:embed="rId3"/>
           <a:stretch>
             <a:fillRect/>
           </a:stretch>
@@ -13955,7 +13838,7 @@
           <p:nvPr/>
         </p:nvPicPr>
         <p:blipFill>
-          <a:blip r:embed="rId2"/>
+          <a:blip r:embed="rId3"/>
           <a:stretch>
             <a:fillRect/>
           </a:stretch>
@@ -13979,7 +13862,7 @@
           <p:nvPr/>
         </p:nvPicPr>
         <p:blipFill>
-          <a:blip r:embed="rId2"/>
+          <a:blip r:embed="rId3"/>
           <a:stretch>
             <a:fillRect/>
           </a:stretch>
@@ -14003,7 +13886,7 @@
           <p:nvPr/>
         </p:nvPicPr>
         <p:blipFill>
-          <a:blip r:embed="rId2"/>
+          <a:blip r:embed="rId3"/>
           <a:stretch>
             <a:fillRect/>
           </a:stretch>
@@ -14027,7 +13910,7 @@
           <p:nvPr/>
         </p:nvPicPr>
         <p:blipFill>
-          <a:blip r:embed="rId2"/>
+          <a:blip r:embed="rId3"/>
           <a:stretch>
             <a:fillRect/>
           </a:stretch>
@@ -14051,7 +13934,7 @@
           <p:nvPr/>
         </p:nvPicPr>
         <p:blipFill>
-          <a:blip r:embed="rId2"/>
+          <a:blip r:embed="rId3"/>
           <a:stretch>
             <a:fillRect/>
           </a:stretch>
@@ -14075,7 +13958,7 @@
           <p:nvPr/>
         </p:nvPicPr>
         <p:blipFill>
-          <a:blip r:embed="rId2"/>
+          <a:blip r:embed="rId3"/>
           <a:stretch>
             <a:fillRect/>
           </a:stretch>
@@ -14099,7 +13982,7 @@
           <p:nvPr/>
         </p:nvPicPr>
         <p:blipFill>
-          <a:blip r:embed="rId2"/>
+          <a:blip r:embed="rId3"/>
           <a:stretch>
             <a:fillRect/>
           </a:stretch>
@@ -14123,7 +14006,7 @@
           <p:nvPr/>
         </p:nvPicPr>
         <p:blipFill>
-          <a:blip r:embed="rId2"/>
+          <a:blip r:embed="rId3"/>
           <a:stretch>
             <a:fillRect/>
           </a:stretch>
@@ -14147,7 +14030,7 @@
           <p:nvPr/>
         </p:nvPicPr>
         <p:blipFill>
-          <a:blip r:embed="rId2"/>
+          <a:blip r:embed="rId3"/>
           <a:stretch>
             <a:fillRect/>
           </a:stretch>
@@ -14171,7 +14054,7 @@
           <p:nvPr/>
         </p:nvPicPr>
         <p:blipFill>
-          <a:blip r:embed="rId2"/>
+          <a:blip r:embed="rId3"/>
           <a:stretch>
             <a:fillRect/>
           </a:stretch>
@@ -14195,7 +14078,7 @@
           <p:nvPr/>
         </p:nvPicPr>
         <p:blipFill>
-          <a:blip r:embed="rId2"/>
+          <a:blip r:embed="rId3"/>
           <a:stretch>
             <a:fillRect/>
           </a:stretch>
@@ -14204,6 +14087,696 @@
           <a:xfrm>
             <a:off x="7375707" y="3502893"/>
             <a:ext cx="97202" cy="102628"/>
+          </a:xfrm>
+          <a:prstGeom prst="rect">
+            <a:avLst/>
+          </a:prstGeom>
+        </p:spPr>
+      </p:pic>
+      <p:pic>
+        <p:nvPicPr>
+          <p:cNvPr id="110" name="Image 109"/>
+          <p:cNvPicPr>
+            <a:picLocks noChangeAspect="1"/>
+          </p:cNvPicPr>
+          <p:nvPr/>
+        </p:nvPicPr>
+        <p:blipFill>
+          <a:blip r:embed="rId3"/>
+          <a:stretch>
+            <a:fillRect/>
+          </a:stretch>
+        </p:blipFill>
+        <p:spPr>
+          <a:xfrm>
+            <a:off x="1287695" y="2345547"/>
+            <a:ext cx="227331" cy="240020"/>
+          </a:xfrm>
+          <a:prstGeom prst="rect">
+            <a:avLst/>
+          </a:prstGeom>
+        </p:spPr>
+      </p:pic>
+      <p:pic>
+        <p:nvPicPr>
+          <p:cNvPr id="69" name="Image 68" descr="OctoMan_Pos.png"/>
+          <p:cNvPicPr>
+            <a:picLocks noChangeAspect="1"/>
+          </p:cNvPicPr>
+          <p:nvPr/>
+        </p:nvPicPr>
+        <p:blipFill>
+          <a:blip r:embed="rId4">
+            <a:extLst>
+              <a:ext uri="{28A0092B-C50C-407E-A947-70E740481C1C}">
+                <a14:useLocalDpi xmlns:a14="http://schemas.microsoft.com/office/drawing/2010/main" val="0"/>
+              </a:ext>
+            </a:extLst>
+          </a:blip>
+          <a:stretch>
+            <a:fillRect/>
+          </a:stretch>
+        </p:blipFill>
+        <p:spPr>
+          <a:xfrm>
+            <a:off x="1257546" y="1963408"/>
+            <a:ext cx="287629" cy="376337"/>
+          </a:xfrm>
+          <a:prstGeom prst="rect">
+            <a:avLst/>
+          </a:prstGeom>
+        </p:spPr>
+      </p:pic>
+      <p:pic>
+        <p:nvPicPr>
+          <p:cNvPr id="77" name="Image 76"/>
+          <p:cNvPicPr>
+            <a:picLocks noChangeAspect="1"/>
+          </p:cNvPicPr>
+          <p:nvPr/>
+        </p:nvPicPr>
+        <p:blipFill>
+          <a:blip r:embed="rId3"/>
+          <a:stretch>
+            <a:fillRect/>
+          </a:stretch>
+        </p:blipFill>
+        <p:spPr>
+          <a:xfrm>
+            <a:off x="3978780" y="2343594"/>
+            <a:ext cx="227331" cy="240020"/>
+          </a:xfrm>
+          <a:prstGeom prst="rect">
+            <a:avLst/>
+          </a:prstGeom>
+        </p:spPr>
+      </p:pic>
+      <p:pic>
+        <p:nvPicPr>
+          <p:cNvPr id="78" name="Image 77" descr="OctoMan_Pos.png"/>
+          <p:cNvPicPr>
+            <a:picLocks noChangeAspect="1"/>
+          </p:cNvPicPr>
+          <p:nvPr/>
+        </p:nvPicPr>
+        <p:blipFill>
+          <a:blip r:embed="rId4">
+            <a:extLst>
+              <a:ext uri="{28A0092B-C50C-407E-A947-70E740481C1C}">
+                <a14:useLocalDpi xmlns:a14="http://schemas.microsoft.com/office/drawing/2010/main" val="0"/>
+              </a:ext>
+            </a:extLst>
+          </a:blip>
+          <a:stretch>
+            <a:fillRect/>
+          </a:stretch>
+        </p:blipFill>
+        <p:spPr>
+          <a:xfrm>
+            <a:off x="3957271" y="1961455"/>
+            <a:ext cx="287629" cy="376337"/>
+          </a:xfrm>
+          <a:prstGeom prst="rect">
+            <a:avLst/>
+          </a:prstGeom>
+        </p:spPr>
+      </p:pic>
+      <p:pic>
+        <p:nvPicPr>
+          <p:cNvPr id="81" name="Image 80"/>
+          <p:cNvPicPr>
+            <a:picLocks noChangeAspect="1"/>
+          </p:cNvPicPr>
+          <p:nvPr/>
+        </p:nvPicPr>
+        <p:blipFill>
+          <a:blip r:embed="rId3"/>
+          <a:stretch>
+            <a:fillRect/>
+          </a:stretch>
+        </p:blipFill>
+        <p:spPr>
+          <a:xfrm>
+            <a:off x="3148704" y="3232584"/>
+            <a:ext cx="227331" cy="240020"/>
+          </a:xfrm>
+          <a:prstGeom prst="rect">
+            <a:avLst/>
+          </a:prstGeom>
+        </p:spPr>
+      </p:pic>
+      <p:pic>
+        <p:nvPicPr>
+          <p:cNvPr id="82" name="Image 81" descr="OctoMan_Pos.png"/>
+          <p:cNvPicPr>
+            <a:picLocks noChangeAspect="1"/>
+          </p:cNvPicPr>
+          <p:nvPr/>
+        </p:nvPicPr>
+        <p:blipFill>
+          <a:blip r:embed="rId4">
+            <a:extLst>
+              <a:ext uri="{28A0092B-C50C-407E-A947-70E740481C1C}">
+                <a14:useLocalDpi xmlns:a14="http://schemas.microsoft.com/office/drawing/2010/main" val="0"/>
+              </a:ext>
+            </a:extLst>
+          </a:blip>
+          <a:stretch>
+            <a:fillRect/>
+          </a:stretch>
+        </p:blipFill>
+        <p:spPr>
+          <a:xfrm>
+            <a:off x="3127195" y="2850445"/>
+            <a:ext cx="287629" cy="376337"/>
+          </a:xfrm>
+          <a:prstGeom prst="rect">
+            <a:avLst/>
+          </a:prstGeom>
+        </p:spPr>
+      </p:pic>
+      <p:pic>
+        <p:nvPicPr>
+          <p:cNvPr id="84" name="Image 83"/>
+          <p:cNvPicPr>
+            <a:picLocks noChangeAspect="1"/>
+          </p:cNvPicPr>
+          <p:nvPr/>
+        </p:nvPicPr>
+        <p:blipFill>
+          <a:blip r:embed="rId3"/>
+          <a:stretch>
+            <a:fillRect/>
+          </a:stretch>
+        </p:blipFill>
+        <p:spPr>
+          <a:xfrm>
+            <a:off x="3597026" y="4142131"/>
+            <a:ext cx="227331" cy="240020"/>
+          </a:xfrm>
+          <a:prstGeom prst="rect">
+            <a:avLst/>
+          </a:prstGeom>
+        </p:spPr>
+      </p:pic>
+      <p:pic>
+        <p:nvPicPr>
+          <p:cNvPr id="89" name="Image 88" descr="OctoMan_Pos.png"/>
+          <p:cNvPicPr>
+            <a:picLocks noChangeAspect="1"/>
+          </p:cNvPicPr>
+          <p:nvPr/>
+        </p:nvPicPr>
+        <p:blipFill>
+          <a:blip r:embed="rId4">
+            <a:extLst>
+              <a:ext uri="{28A0092B-C50C-407E-A947-70E740481C1C}">
+                <a14:useLocalDpi xmlns:a14="http://schemas.microsoft.com/office/drawing/2010/main" val="0"/>
+              </a:ext>
+            </a:extLst>
+          </a:blip>
+          <a:stretch>
+            <a:fillRect/>
+          </a:stretch>
+        </p:blipFill>
+        <p:spPr>
+          <a:xfrm>
+            <a:off x="3575517" y="3759992"/>
+            <a:ext cx="287629" cy="376337"/>
+          </a:xfrm>
+          <a:prstGeom prst="rect">
+            <a:avLst/>
+          </a:prstGeom>
+        </p:spPr>
+      </p:pic>
+      <p:pic>
+        <p:nvPicPr>
+          <p:cNvPr id="92" name="Image 91"/>
+          <p:cNvPicPr>
+            <a:picLocks noChangeAspect="1"/>
+          </p:cNvPicPr>
+          <p:nvPr/>
+        </p:nvPicPr>
+        <p:blipFill>
+          <a:blip r:embed="rId3"/>
+          <a:stretch>
+            <a:fillRect/>
+          </a:stretch>
+        </p:blipFill>
+        <p:spPr>
+          <a:xfrm>
+            <a:off x="1560609" y="3965560"/>
+            <a:ext cx="227331" cy="240020"/>
+          </a:xfrm>
+          <a:prstGeom prst="rect">
+            <a:avLst/>
+          </a:prstGeom>
+        </p:spPr>
+      </p:pic>
+      <p:pic>
+        <p:nvPicPr>
+          <p:cNvPr id="93" name="Image 92" descr="OctoMan_Pos.png"/>
+          <p:cNvPicPr>
+            <a:picLocks noChangeAspect="1"/>
+          </p:cNvPicPr>
+          <p:nvPr/>
+        </p:nvPicPr>
+        <p:blipFill>
+          <a:blip r:embed="rId4">
+            <a:extLst>
+              <a:ext uri="{28A0092B-C50C-407E-A947-70E740481C1C}">
+                <a14:useLocalDpi xmlns:a14="http://schemas.microsoft.com/office/drawing/2010/main" val="0"/>
+              </a:ext>
+            </a:extLst>
+          </a:blip>
+          <a:stretch>
+            <a:fillRect/>
+          </a:stretch>
+        </p:blipFill>
+        <p:spPr>
+          <a:xfrm>
+            <a:off x="1530460" y="3583421"/>
+            <a:ext cx="287629" cy="376337"/>
+          </a:xfrm>
+          <a:prstGeom prst="rect">
+            <a:avLst/>
+          </a:prstGeom>
+        </p:spPr>
+      </p:pic>
+      <p:pic>
+        <p:nvPicPr>
+          <p:cNvPr id="94" name="Image 93" descr="OctoMan_Pos.png"/>
+          <p:cNvPicPr>
+            <a:picLocks noChangeAspect="1"/>
+          </p:cNvPicPr>
+          <p:nvPr/>
+        </p:nvPicPr>
+        <p:blipFill>
+          <a:blip r:embed="rId4">
+            <a:extLst>
+              <a:ext uri="{28A0092B-C50C-407E-A947-70E740481C1C}">
+                <a14:useLocalDpi xmlns:a14="http://schemas.microsoft.com/office/drawing/2010/main" val="0"/>
+              </a:ext>
+            </a:extLst>
+          </a:blip>
+          <a:stretch>
+            <a:fillRect/>
+          </a:stretch>
+        </p:blipFill>
+        <p:spPr>
+          <a:xfrm>
+            <a:off x="5108744" y="2175028"/>
+            <a:ext cx="82543" cy="108000"/>
+          </a:xfrm>
+          <a:prstGeom prst="rect">
+            <a:avLst/>
+          </a:prstGeom>
+        </p:spPr>
+      </p:pic>
+      <p:pic>
+        <p:nvPicPr>
+          <p:cNvPr id="96" name="Image 95" descr="OctoMan_Pos.png"/>
+          <p:cNvPicPr>
+            <a:picLocks noChangeAspect="1"/>
+          </p:cNvPicPr>
+          <p:nvPr/>
+        </p:nvPicPr>
+        <p:blipFill>
+          <a:blip r:embed="rId4">
+            <a:extLst>
+              <a:ext uri="{28A0092B-C50C-407E-A947-70E740481C1C}">
+                <a14:useLocalDpi xmlns:a14="http://schemas.microsoft.com/office/drawing/2010/main" val="0"/>
+              </a:ext>
+            </a:extLst>
+          </a:blip>
+          <a:stretch>
+            <a:fillRect/>
+          </a:stretch>
+        </p:blipFill>
+        <p:spPr>
+          <a:xfrm>
+            <a:off x="6449925" y="2229792"/>
+            <a:ext cx="82543" cy="108000"/>
+          </a:xfrm>
+          <a:prstGeom prst="rect">
+            <a:avLst/>
+          </a:prstGeom>
+        </p:spPr>
+      </p:pic>
+      <p:pic>
+        <p:nvPicPr>
+          <p:cNvPr id="99" name="Image 98" descr="OctoMan_Pos.png"/>
+          <p:cNvPicPr>
+            <a:picLocks noChangeAspect="1"/>
+          </p:cNvPicPr>
+          <p:nvPr/>
+        </p:nvPicPr>
+        <p:blipFill>
+          <a:blip r:embed="rId4">
+            <a:extLst>
+              <a:ext uri="{28A0092B-C50C-407E-A947-70E740481C1C}">
+                <a14:useLocalDpi xmlns:a14="http://schemas.microsoft.com/office/drawing/2010/main" val="0"/>
+              </a:ext>
+            </a:extLst>
+          </a:blip>
+          <a:stretch>
+            <a:fillRect/>
+          </a:stretch>
+        </p:blipFill>
+        <p:spPr>
+          <a:xfrm>
+            <a:off x="4707529" y="3703156"/>
+            <a:ext cx="82543" cy="108000"/>
+          </a:xfrm>
+          <a:prstGeom prst="rect">
+            <a:avLst/>
+          </a:prstGeom>
+        </p:spPr>
+      </p:pic>
+      <p:pic>
+        <p:nvPicPr>
+          <p:cNvPr id="100" name="Image 99" descr="OctoMan_Pos.png"/>
+          <p:cNvPicPr>
+            <a:picLocks noChangeAspect="1"/>
+          </p:cNvPicPr>
+          <p:nvPr/>
+        </p:nvPicPr>
+        <p:blipFill>
+          <a:blip r:embed="rId4">
+            <a:extLst>
+              <a:ext uri="{28A0092B-C50C-407E-A947-70E740481C1C}">
+                <a14:useLocalDpi xmlns:a14="http://schemas.microsoft.com/office/drawing/2010/main" val="0"/>
+              </a:ext>
+            </a:extLst>
+          </a:blip>
+          <a:stretch>
+            <a:fillRect/>
+          </a:stretch>
+        </p:blipFill>
+        <p:spPr>
+          <a:xfrm>
+            <a:off x="4565549" y="3104924"/>
+            <a:ext cx="82543" cy="108000"/>
+          </a:xfrm>
+          <a:prstGeom prst="rect">
+            <a:avLst/>
+          </a:prstGeom>
+        </p:spPr>
+      </p:pic>
+      <p:pic>
+        <p:nvPicPr>
+          <p:cNvPr id="102" name="Image 101" descr="OctoMan_Pos.png"/>
+          <p:cNvPicPr>
+            <a:picLocks noChangeAspect="1"/>
+          </p:cNvPicPr>
+          <p:nvPr/>
+        </p:nvPicPr>
+        <p:blipFill>
+          <a:blip r:embed="rId4">
+            <a:extLst>
+              <a:ext uri="{28A0092B-C50C-407E-A947-70E740481C1C}">
+                <a14:useLocalDpi xmlns:a14="http://schemas.microsoft.com/office/drawing/2010/main" val="0"/>
+              </a:ext>
+            </a:extLst>
+          </a:blip>
+          <a:stretch>
+            <a:fillRect/>
+          </a:stretch>
+        </p:blipFill>
+        <p:spPr>
+          <a:xfrm>
+            <a:off x="7383037" y="3393280"/>
+            <a:ext cx="82543" cy="108000"/>
+          </a:xfrm>
+          <a:prstGeom prst="rect">
+            <a:avLst/>
+          </a:prstGeom>
+        </p:spPr>
+      </p:pic>
+      <p:pic>
+        <p:nvPicPr>
+          <p:cNvPr id="103" name="Image 102" descr="OctoMan_Pos.png"/>
+          <p:cNvPicPr>
+            <a:picLocks noChangeAspect="1"/>
+          </p:cNvPicPr>
+          <p:nvPr/>
+        </p:nvPicPr>
+        <p:blipFill>
+          <a:blip r:embed="rId4">
+            <a:extLst>
+              <a:ext uri="{28A0092B-C50C-407E-A947-70E740481C1C}">
+                <a14:useLocalDpi xmlns:a14="http://schemas.microsoft.com/office/drawing/2010/main" val="0"/>
+              </a:ext>
+            </a:extLst>
+          </a:blip>
+          <a:stretch>
+            <a:fillRect/>
+          </a:stretch>
+        </p:blipFill>
+        <p:spPr>
+          <a:xfrm>
+            <a:off x="5684528" y="2537253"/>
+            <a:ext cx="82543" cy="108000"/>
+          </a:xfrm>
+          <a:prstGeom prst="rect">
+            <a:avLst/>
+          </a:prstGeom>
+        </p:spPr>
+      </p:pic>
+      <p:pic>
+        <p:nvPicPr>
+          <p:cNvPr id="104" name="Image 103" descr="OctoMan_Pos.png"/>
+          <p:cNvPicPr>
+            <a:picLocks noChangeAspect="1"/>
+          </p:cNvPicPr>
+          <p:nvPr/>
+        </p:nvPicPr>
+        <p:blipFill>
+          <a:blip r:embed="rId4">
+            <a:extLst>
+              <a:ext uri="{28A0092B-C50C-407E-A947-70E740481C1C}">
+                <a14:useLocalDpi xmlns:a14="http://schemas.microsoft.com/office/drawing/2010/main" val="0"/>
+              </a:ext>
+            </a:extLst>
+          </a:blip>
+          <a:stretch>
+            <a:fillRect/>
+          </a:stretch>
+        </p:blipFill>
+        <p:spPr>
+          <a:xfrm>
+            <a:off x="6299502" y="2796445"/>
+            <a:ext cx="82543" cy="108000"/>
+          </a:xfrm>
+          <a:prstGeom prst="rect">
+            <a:avLst/>
+          </a:prstGeom>
+        </p:spPr>
+      </p:pic>
+      <p:pic>
+        <p:nvPicPr>
+          <p:cNvPr id="105" name="Image 104" descr="OctoMan_Pos.png"/>
+          <p:cNvPicPr>
+            <a:picLocks noChangeAspect="1"/>
+          </p:cNvPicPr>
+          <p:nvPr/>
+        </p:nvPicPr>
+        <p:blipFill>
+          <a:blip r:embed="rId4">
+            <a:extLst>
+              <a:ext uri="{28A0092B-C50C-407E-A947-70E740481C1C}">
+                <a14:useLocalDpi xmlns:a14="http://schemas.microsoft.com/office/drawing/2010/main" val="0"/>
+              </a:ext>
+            </a:extLst>
+          </a:blip>
+          <a:stretch>
+            <a:fillRect/>
+          </a:stretch>
+        </p:blipFill>
+        <p:spPr>
+          <a:xfrm>
+            <a:off x="5751379" y="2961302"/>
+            <a:ext cx="82543" cy="108000"/>
+          </a:xfrm>
+          <a:prstGeom prst="rect">
+            <a:avLst/>
+          </a:prstGeom>
+        </p:spPr>
+      </p:pic>
+      <p:pic>
+        <p:nvPicPr>
+          <p:cNvPr id="106" name="Image 105" descr="OctoMan_Pos.png"/>
+          <p:cNvPicPr>
+            <a:picLocks noChangeAspect="1"/>
+          </p:cNvPicPr>
+          <p:nvPr/>
+        </p:nvPicPr>
+        <p:blipFill>
+          <a:blip r:embed="rId4">
+            <a:extLst>
+              <a:ext uri="{28A0092B-C50C-407E-A947-70E740481C1C}">
+                <a14:useLocalDpi xmlns:a14="http://schemas.microsoft.com/office/drawing/2010/main" val="0"/>
+              </a:ext>
+            </a:extLst>
+          </a:blip>
+          <a:stretch>
+            <a:fillRect/>
+          </a:stretch>
+        </p:blipFill>
+        <p:spPr>
+          <a:xfrm>
+            <a:off x="5343687" y="3443523"/>
+            <a:ext cx="82543" cy="108000"/>
+          </a:xfrm>
+          <a:prstGeom prst="rect">
+            <a:avLst/>
+          </a:prstGeom>
+        </p:spPr>
+      </p:pic>
+      <p:pic>
+        <p:nvPicPr>
+          <p:cNvPr id="107" name="Image 106" descr="OctoMan_Pos.png"/>
+          <p:cNvPicPr>
+            <a:picLocks noChangeAspect="1"/>
+          </p:cNvPicPr>
+          <p:nvPr/>
+        </p:nvPicPr>
+        <p:blipFill>
+          <a:blip r:embed="rId4">
+            <a:extLst>
+              <a:ext uri="{28A0092B-C50C-407E-A947-70E740481C1C}">
+                <a14:useLocalDpi xmlns:a14="http://schemas.microsoft.com/office/drawing/2010/main" val="0"/>
+              </a:ext>
+            </a:extLst>
+          </a:blip>
+          <a:stretch>
+            <a:fillRect/>
+          </a:stretch>
+        </p:blipFill>
+        <p:spPr>
+          <a:xfrm>
+            <a:off x="5635928" y="3962606"/>
+            <a:ext cx="82543" cy="108000"/>
+          </a:xfrm>
+          <a:prstGeom prst="rect">
+            <a:avLst/>
+          </a:prstGeom>
+        </p:spPr>
+      </p:pic>
+      <p:pic>
+        <p:nvPicPr>
+          <p:cNvPr id="108" name="Image 107" descr="OctoMan_Pos.png"/>
+          <p:cNvPicPr>
+            <a:picLocks noChangeAspect="1"/>
+          </p:cNvPicPr>
+          <p:nvPr/>
+        </p:nvPicPr>
+        <p:blipFill>
+          <a:blip r:embed="rId4">
+            <a:extLst>
+              <a:ext uri="{28A0092B-C50C-407E-A947-70E740481C1C}">
+                <a14:useLocalDpi xmlns:a14="http://schemas.microsoft.com/office/drawing/2010/main" val="0"/>
+              </a:ext>
+            </a:extLst>
+          </a:blip>
+          <a:stretch>
+            <a:fillRect/>
+          </a:stretch>
+        </p:blipFill>
+        <p:spPr>
+          <a:xfrm>
+            <a:off x="6040386" y="3582393"/>
+            <a:ext cx="82543" cy="108000"/>
+          </a:xfrm>
+          <a:prstGeom prst="rect">
+            <a:avLst/>
+          </a:prstGeom>
+        </p:spPr>
+      </p:pic>
+      <p:pic>
+        <p:nvPicPr>
+          <p:cNvPr id="109" name="Image 108" descr="OctoMan_Pos.png"/>
+          <p:cNvPicPr>
+            <a:picLocks noChangeAspect="1"/>
+          </p:cNvPicPr>
+          <p:nvPr/>
+        </p:nvPicPr>
+        <p:blipFill>
+          <a:blip r:embed="rId4">
+            <a:extLst>
+              <a:ext uri="{28A0092B-C50C-407E-A947-70E740481C1C}">
+                <a14:useLocalDpi xmlns:a14="http://schemas.microsoft.com/office/drawing/2010/main" val="0"/>
+              </a:ext>
+            </a:extLst>
+          </a:blip>
+          <a:stretch>
+            <a:fillRect/>
+          </a:stretch>
+        </p:blipFill>
+        <p:spPr>
+          <a:xfrm>
+            <a:off x="7014081" y="3760079"/>
+            <a:ext cx="82543" cy="108000"/>
+          </a:xfrm>
+          <a:prstGeom prst="rect">
+            <a:avLst/>
+          </a:prstGeom>
+        </p:spPr>
+      </p:pic>
+      <p:pic>
+        <p:nvPicPr>
+          <p:cNvPr id="111" name="Image 110" descr="OctoMan_Pos.png"/>
+          <p:cNvPicPr>
+            <a:picLocks noChangeAspect="1"/>
+          </p:cNvPicPr>
+          <p:nvPr/>
+        </p:nvPicPr>
+        <p:blipFill>
+          <a:blip r:embed="rId4">
+            <a:extLst>
+              <a:ext uri="{28A0092B-C50C-407E-A947-70E740481C1C}">
+                <a14:useLocalDpi xmlns:a14="http://schemas.microsoft.com/office/drawing/2010/main" val="0"/>
+              </a:ext>
+            </a:extLst>
+          </a:blip>
+          <a:stretch>
+            <a:fillRect/>
+          </a:stretch>
+        </p:blipFill>
+        <p:spPr>
+          <a:xfrm>
+            <a:off x="6664377" y="3155167"/>
+            <a:ext cx="82543" cy="108000"/>
+          </a:xfrm>
+          <a:prstGeom prst="rect">
+            <a:avLst/>
+          </a:prstGeom>
+        </p:spPr>
+      </p:pic>
+      <p:pic>
+        <p:nvPicPr>
+          <p:cNvPr id="116" name="Image 115" descr="OctoMan_Pos.png"/>
+          <p:cNvPicPr>
+            <a:picLocks noChangeAspect="1"/>
+          </p:cNvPicPr>
+          <p:nvPr/>
+        </p:nvPicPr>
+        <p:blipFill>
+          <a:blip r:embed="rId4">
+            <a:extLst>
+              <a:ext uri="{28A0092B-C50C-407E-A947-70E740481C1C}">
+                <a14:useLocalDpi xmlns:a14="http://schemas.microsoft.com/office/drawing/2010/main" val="0"/>
+              </a:ext>
+            </a:extLst>
+          </a:blip>
+          <a:stretch>
+            <a:fillRect/>
+          </a:stretch>
+        </p:blipFill>
+        <p:spPr>
+          <a:xfrm>
+            <a:off x="6345499" y="3954809"/>
+            <a:ext cx="82543" cy="108000"/>
           </a:xfrm>
           <a:prstGeom prst="rect">
             <a:avLst/>

</xml_diff>

<commit_message>
j'ai tout rédigé \o/
</commit_message>
<xml_diff>
--- a/microservices/illus.pptx
+++ b/microservices/illus.pptx
@@ -15444,7 +15444,10 @@
           <a:prstGeom prst="straightConnector1">
             <a:avLst/>
           </a:prstGeom>
-          <a:ln w="12700" cmpd="sng">
+          <a:ln w="19050" cmpd="sng">
+            <a:solidFill>
+              <a:schemeClr val="tx2"/>
+            </a:solidFill>
             <a:headEnd type="none" w="med" len="med"/>
             <a:tailEnd type="arrow" w="sm" len="sm"/>
           </a:ln>
@@ -15481,7 +15484,10 @@
           <a:prstGeom prst="straightConnector1">
             <a:avLst/>
           </a:prstGeom>
-          <a:ln w="12700" cmpd="sng">
+          <a:ln w="19050" cmpd="sng">
+            <a:solidFill>
+              <a:schemeClr val="tx2"/>
+            </a:solidFill>
             <a:headEnd type="none" w="med" len="med"/>
             <a:tailEnd type="arrow" w="sm" len="sm"/>
           </a:ln>
@@ -15665,7 +15671,10 @@
           <a:prstGeom prst="straightConnector1">
             <a:avLst/>
           </a:prstGeom>
-          <a:ln w="12700" cmpd="sng">
+          <a:ln w="19050" cmpd="sng">
+            <a:solidFill>
+              <a:schemeClr val="tx2"/>
+            </a:solidFill>
             <a:headEnd type="none" w="med" len="med"/>
             <a:tailEnd type="arrow" w="sm" len="sm"/>
           </a:ln>
@@ -15702,7 +15711,10 @@
           <a:prstGeom prst="straightConnector1">
             <a:avLst/>
           </a:prstGeom>
-          <a:ln w="12700" cmpd="sng">
+          <a:ln w="19050" cmpd="sng">
+            <a:solidFill>
+              <a:schemeClr val="tx2"/>
+            </a:solidFill>
             <a:headEnd type="none" w="med" len="med"/>
             <a:tailEnd type="arrow" w="sm" len="sm"/>
           </a:ln>
@@ -15739,7 +15751,10 @@
           <a:prstGeom prst="straightConnector1">
             <a:avLst/>
           </a:prstGeom>
-          <a:ln w="12700" cmpd="sng">
+          <a:ln w="19050" cmpd="sng">
+            <a:solidFill>
+              <a:schemeClr val="tx2"/>
+            </a:solidFill>
             <a:headEnd type="none" w="med" len="med"/>
             <a:tailEnd type="arrow" w="sm" len="sm"/>
           </a:ln>

</xml_diff>

<commit_message>
légende + correction 3eme illustration
</commit_message>
<xml_diff>
--- a/microservices/illus.pptx
+++ b/microservices/illus.pptx
@@ -17285,7 +17285,7 @@
         </p:blipFill>
         <p:spPr>
           <a:xfrm>
-            <a:off x="2488041" y="1716586"/>
+            <a:off x="2976496" y="1716586"/>
             <a:ext cx="1424652" cy="2436239"/>
           </a:xfrm>
           <a:prstGeom prst="rect">
@@ -17309,7 +17309,7 @@
         </p:blipFill>
         <p:spPr>
           <a:xfrm>
-            <a:off x="2699915" y="2155014"/>
+            <a:off x="3188370" y="2155014"/>
             <a:ext cx="252000" cy="252000"/>
           </a:xfrm>
           <a:prstGeom prst="rect">
@@ -17333,7 +17333,7 @@
         </p:blipFill>
         <p:spPr>
           <a:xfrm>
-            <a:off x="2747060" y="2748447"/>
+            <a:off x="3235515" y="2748447"/>
             <a:ext cx="252000" cy="252000"/>
           </a:xfrm>
           <a:prstGeom prst="rect">
@@ -17357,7 +17357,7 @@
         </p:blipFill>
         <p:spPr>
           <a:xfrm>
-            <a:off x="3353286" y="2719359"/>
+            <a:off x="3841741" y="2719359"/>
             <a:ext cx="252000" cy="252000"/>
           </a:xfrm>
           <a:prstGeom prst="rect">
@@ -17381,7 +17381,7 @@
         </p:blipFill>
         <p:spPr>
           <a:xfrm>
-            <a:off x="3546954" y="2453290"/>
+            <a:off x="4035409" y="2453290"/>
             <a:ext cx="252000" cy="252000"/>
           </a:xfrm>
           <a:prstGeom prst="rect">
@@ -17405,7 +17405,7 @@
         </p:blipFill>
         <p:spPr>
           <a:xfrm>
-            <a:off x="3227286" y="3170954"/>
+            <a:off x="3715741" y="3170954"/>
             <a:ext cx="252000" cy="252000"/>
           </a:xfrm>
           <a:prstGeom prst="rect">
@@ -17429,7 +17429,7 @@
         </p:blipFill>
         <p:spPr>
           <a:xfrm>
-            <a:off x="2830960" y="3279674"/>
+            <a:off x="3319415" y="3279674"/>
             <a:ext cx="252000" cy="252000"/>
           </a:xfrm>
           <a:prstGeom prst="rect">
@@ -17453,7 +17453,7 @@
         </p:blipFill>
         <p:spPr>
           <a:xfrm>
-            <a:off x="3227286" y="2029014"/>
+            <a:off x="3715741" y="2029014"/>
             <a:ext cx="252000" cy="252000"/>
           </a:xfrm>
           <a:prstGeom prst="rect">
@@ -17472,7 +17472,7 @@
         </p:nvCxnSpPr>
         <p:spPr bwMode="auto">
           <a:xfrm flipH="1" flipV="1">
-            <a:off x="2825915" y="2407014"/>
+            <a:off x="3314370" y="2407014"/>
             <a:ext cx="47145" cy="341433"/>
           </a:xfrm>
           <a:prstGeom prst="straightConnector1">
@@ -17512,7 +17512,7 @@
         </p:nvCxnSpPr>
         <p:spPr bwMode="auto">
           <a:xfrm flipV="1">
-            <a:off x="2951915" y="2155014"/>
+            <a:off x="3440370" y="2155014"/>
             <a:ext cx="275371" cy="126000"/>
           </a:xfrm>
           <a:prstGeom prst="straightConnector1">
@@ -17552,7 +17552,7 @@
         </p:nvCxnSpPr>
         <p:spPr bwMode="auto">
           <a:xfrm flipH="1" flipV="1">
-            <a:off x="2873060" y="3000447"/>
+            <a:off x="3361515" y="3000447"/>
             <a:ext cx="83900" cy="279227"/>
           </a:xfrm>
           <a:prstGeom prst="straightConnector1">
@@ -17592,7 +17592,7 @@
         </p:nvCxnSpPr>
         <p:spPr bwMode="auto">
           <a:xfrm flipH="1" flipV="1">
-            <a:off x="3353286" y="2281014"/>
+            <a:off x="3841741" y="2281014"/>
             <a:ext cx="126000" cy="438345"/>
           </a:xfrm>
           <a:prstGeom prst="straightConnector1">
@@ -17632,7 +17632,7 @@
         </p:nvCxnSpPr>
         <p:spPr bwMode="auto">
           <a:xfrm flipH="1" flipV="1">
-            <a:off x="3479286" y="2155014"/>
+            <a:off x="3967741" y="2155014"/>
             <a:ext cx="193668" cy="298276"/>
           </a:xfrm>
           <a:prstGeom prst="straightConnector1">
@@ -17672,7 +17672,7 @@
         </p:nvCxnSpPr>
         <p:spPr bwMode="auto">
           <a:xfrm flipH="1" flipV="1">
-            <a:off x="2999060" y="2874447"/>
+            <a:off x="3487515" y="2874447"/>
             <a:ext cx="228226" cy="422507"/>
           </a:xfrm>
           <a:prstGeom prst="straightConnector1">
@@ -17712,7 +17712,7 @@
         </p:nvCxnSpPr>
         <p:spPr bwMode="auto">
           <a:xfrm flipV="1">
-            <a:off x="3353286" y="2971359"/>
+            <a:off x="3841741" y="2971359"/>
             <a:ext cx="126000" cy="199595"/>
           </a:xfrm>
           <a:prstGeom prst="straightConnector1">
@@ -17763,7 +17763,7 @@
         </p:blipFill>
         <p:spPr>
           <a:xfrm>
-            <a:off x="5096771" y="1530328"/>
+            <a:off x="5523059" y="1530328"/>
             <a:ext cx="859690" cy="1470120"/>
           </a:xfrm>
           <a:prstGeom prst="rect">
@@ -17793,7 +17793,7 @@
         </p:blipFill>
         <p:spPr>
           <a:xfrm>
-            <a:off x="7146005" y="2489169"/>
+            <a:off x="6808527" y="2489169"/>
             <a:ext cx="597967" cy="1022558"/>
           </a:xfrm>
           <a:prstGeom prst="rect">
@@ -17817,7 +17817,7 @@
         </p:blipFill>
         <p:spPr>
           <a:xfrm>
-            <a:off x="3082960" y="3666639"/>
+            <a:off x="3571415" y="3666639"/>
             <a:ext cx="252000" cy="252000"/>
           </a:xfrm>
           <a:prstGeom prst="rect">
@@ -17836,7 +17836,7 @@
         </p:nvCxnSpPr>
         <p:spPr bwMode="auto">
           <a:xfrm flipH="1" flipV="1">
-            <a:off x="2956960" y="3531674"/>
+            <a:off x="3445415" y="3531674"/>
             <a:ext cx="126000" cy="260965"/>
           </a:xfrm>
           <a:prstGeom prst="straightConnector1">
@@ -17881,7 +17881,7 @@
         </p:blipFill>
         <p:spPr>
           <a:xfrm>
-            <a:off x="5212681" y="1853390"/>
+            <a:off x="5638969" y="1853390"/>
             <a:ext cx="252000" cy="252000"/>
           </a:xfrm>
           <a:prstGeom prst="rect">
@@ -17905,7 +17905,7 @@
         </p:blipFill>
         <p:spPr>
           <a:xfrm>
-            <a:off x="5365081" y="2338780"/>
+            <a:off x="5791369" y="2338780"/>
             <a:ext cx="252000" cy="252000"/>
           </a:xfrm>
           <a:prstGeom prst="rect">
@@ -17929,7 +17929,7 @@
         </p:blipFill>
         <p:spPr>
           <a:xfrm>
-            <a:off x="5617081" y="1903014"/>
+            <a:off x="6043369" y="1903014"/>
             <a:ext cx="252000" cy="252000"/>
           </a:xfrm>
           <a:prstGeom prst="rect">
@@ -17983,7 +17983,7 @@
         </p:blipFill>
         <p:spPr>
           <a:xfrm>
-            <a:off x="6536480" y="1518643"/>
+            <a:off x="6794029" y="1563048"/>
             <a:ext cx="372134" cy="636371"/>
           </a:xfrm>
           <a:prstGeom prst="rect">
@@ -18007,7 +18007,7 @@
         </p:blipFill>
         <p:spPr>
           <a:xfrm>
-            <a:off x="6596547" y="1823148"/>
+            <a:off x="6854096" y="1867553"/>
             <a:ext cx="252000" cy="252000"/>
           </a:xfrm>
           <a:prstGeom prst="rect">
@@ -18037,7 +18037,7 @@
         </p:blipFill>
         <p:spPr>
           <a:xfrm>
-            <a:off x="6350413" y="3282268"/>
+            <a:off x="6234960" y="3353316"/>
             <a:ext cx="372134" cy="636371"/>
           </a:xfrm>
           <a:prstGeom prst="rect">
@@ -18061,7 +18061,7 @@
         </p:blipFill>
         <p:spPr>
           <a:xfrm>
-            <a:off x="6410480" y="3586773"/>
+            <a:off x="6295027" y="3657821"/>
             <a:ext cx="252000" cy="252000"/>
           </a:xfrm>
           <a:prstGeom prst="rect">
@@ -18085,7 +18085,7 @@
         </p:blipFill>
         <p:spPr>
           <a:xfrm>
-            <a:off x="7444026" y="2874447"/>
+            <a:off x="7106548" y="2874447"/>
             <a:ext cx="252000" cy="252000"/>
           </a:xfrm>
           <a:prstGeom prst="rect">
@@ -18109,7 +18109,7 @@
         </p:blipFill>
         <p:spPr>
           <a:xfrm>
-            <a:off x="7218179" y="3153674"/>
+            <a:off x="6880701" y="3153674"/>
             <a:ext cx="252000" cy="252000"/>
           </a:xfrm>
           <a:prstGeom prst="rect">
@@ -18129,7 +18129,7 @@
         <p:spPr bwMode="auto">
           <a:xfrm flipH="1">
             <a:off x="5524748" y="3000448"/>
-            <a:ext cx="1868" cy="422507"/>
+            <a:ext cx="428156" cy="422507"/>
           </a:xfrm>
           <a:prstGeom prst="straightConnector1">
             <a:avLst/>
@@ -18165,7 +18165,7 @@
         </p:nvCxnSpPr>
         <p:spPr bwMode="auto">
           <a:xfrm flipH="1">
-            <a:off x="5617081" y="2155014"/>
+            <a:off x="6043369" y="2155014"/>
             <a:ext cx="126000" cy="309766"/>
           </a:xfrm>
           <a:prstGeom prst="straightConnector1">
@@ -18205,7 +18205,7 @@
         </p:nvCxnSpPr>
         <p:spPr bwMode="auto">
           <a:xfrm>
-            <a:off x="5338681" y="2105390"/>
+            <a:off x="5764969" y="2105390"/>
             <a:ext cx="152400" cy="233390"/>
           </a:xfrm>
           <a:prstGeom prst="straightConnector1">
@@ -18245,8 +18245,8 @@
         </p:nvCxnSpPr>
         <p:spPr bwMode="auto">
           <a:xfrm flipV="1">
-            <a:off x="5956461" y="1836829"/>
-            <a:ext cx="580019" cy="428559"/>
+            <a:off x="6382749" y="1881234"/>
+            <a:ext cx="411280" cy="384154"/>
           </a:xfrm>
           <a:prstGeom prst="straightConnector1">
             <a:avLst/>
@@ -18282,7 +18282,7 @@
         </p:nvCxnSpPr>
         <p:spPr bwMode="auto">
           <a:xfrm flipH="1">
-            <a:off x="7344179" y="3000447"/>
+            <a:off x="7006701" y="3000447"/>
             <a:ext cx="99847" cy="153227"/>
           </a:xfrm>
           <a:prstGeom prst="straightConnector1">
@@ -18322,8 +18322,8 @@
         </p:nvCxnSpPr>
         <p:spPr bwMode="auto">
           <a:xfrm flipH="1">
-            <a:off x="6722547" y="3511727"/>
-            <a:ext cx="722442" cy="88727"/>
+            <a:off x="6607094" y="3511727"/>
+            <a:ext cx="500417" cy="159775"/>
           </a:xfrm>
           <a:prstGeom prst="straightConnector1">
             <a:avLst/>
@@ -18352,14 +18352,15 @@
         <p:nvCxnSpPr>
           <p:cNvPr id="174" name="Connecteur droit avec flèche 173"/>
           <p:cNvCxnSpPr>
+            <a:stCxn id="107" idx="2"/>
             <a:endCxn id="160" idx="0"/>
           </p:cNvCxnSpPr>
           <p:nvPr/>
         </p:nvCxnSpPr>
         <p:spPr bwMode="auto">
           <a:xfrm>
-            <a:off x="5956461" y="2281014"/>
-            <a:ext cx="580019" cy="1001254"/>
+            <a:off x="5952904" y="3000448"/>
+            <a:ext cx="468123" cy="352868"/>
           </a:xfrm>
           <a:prstGeom prst="straightConnector1">
             <a:avLst/>
@@ -18389,13 +18390,14 @@
           <p:cNvPr id="175" name="Connecteur droit avec flèche 174"/>
           <p:cNvCxnSpPr>
             <a:stCxn id="107" idx="3"/>
+            <a:endCxn id="108" idx="1"/>
           </p:cNvCxnSpPr>
           <p:nvPr/>
         </p:nvCxnSpPr>
         <p:spPr bwMode="auto">
           <a:xfrm>
-            <a:off x="5956461" y="2265388"/>
-            <a:ext cx="1341944" cy="887460"/>
+            <a:off x="6382749" y="2265388"/>
+            <a:ext cx="425778" cy="735060"/>
           </a:xfrm>
           <a:prstGeom prst="straightConnector1">
             <a:avLst/>
@@ -18420,6 +18422,330 @@
           </a:fontRef>
         </p:style>
       </p:cxnSp>
+      <p:pic>
+        <p:nvPicPr>
+          <p:cNvPr id="43" name="Image 42"/>
+          <p:cNvPicPr>
+            <a:picLocks noChangeAspect="1"/>
+          </p:cNvPicPr>
+          <p:nvPr/>
+        </p:nvPicPr>
+        <p:blipFill>
+          <a:blip r:embed="rId4"/>
+          <a:stretch>
+            <a:fillRect/>
+          </a:stretch>
+        </p:blipFill>
+        <p:spPr>
+          <a:xfrm>
+            <a:off x="5055947" y="2430069"/>
+            <a:ext cx="420403" cy="443869"/>
+          </a:xfrm>
+          <a:prstGeom prst="rect">
+            <a:avLst/>
+          </a:prstGeom>
+        </p:spPr>
+      </p:pic>
+      <p:pic>
+        <p:nvPicPr>
+          <p:cNvPr id="45" name="Image 44" descr="OctoMan_Pos.png"/>
+          <p:cNvPicPr>
+            <a:picLocks noChangeAspect="1"/>
+          </p:cNvPicPr>
+          <p:nvPr/>
+        </p:nvPicPr>
+        <p:blipFill>
+          <a:blip r:embed="rId5">
+            <a:extLst>
+              <a:ext uri="{28A0092B-C50C-407E-A947-70E740481C1C}">
+                <a14:useLocalDpi xmlns:a14="http://schemas.microsoft.com/office/drawing/2010/main" val="0"/>
+              </a:ext>
+            </a:extLst>
+          </a:blip>
+          <a:stretch>
+            <a:fillRect/>
+          </a:stretch>
+        </p:blipFill>
+        <p:spPr>
+          <a:xfrm>
+            <a:off x="4991147" y="1642318"/>
+            <a:ext cx="531912" cy="695960"/>
+          </a:xfrm>
+          <a:prstGeom prst="rect">
+            <a:avLst/>
+          </a:prstGeom>
+        </p:spPr>
+      </p:pic>
+      <p:pic>
+        <p:nvPicPr>
+          <p:cNvPr id="46" name="Image 45"/>
+          <p:cNvPicPr>
+            <a:picLocks noChangeAspect="1"/>
+          </p:cNvPicPr>
+          <p:nvPr/>
+        </p:nvPicPr>
+        <p:blipFill>
+          <a:blip r:embed="rId4"/>
+          <a:stretch>
+            <a:fillRect/>
+          </a:stretch>
+        </p:blipFill>
+        <p:spPr>
+          <a:xfrm>
+            <a:off x="2031826" y="3243668"/>
+            <a:ext cx="766759" cy="809557"/>
+          </a:xfrm>
+          <a:prstGeom prst="rect">
+            <a:avLst/>
+          </a:prstGeom>
+        </p:spPr>
+      </p:pic>
+      <p:pic>
+        <p:nvPicPr>
+          <p:cNvPr id="47" name="Image 46" descr="OctoMan_Pos.png"/>
+          <p:cNvPicPr>
+            <a:picLocks noChangeAspect="1"/>
+          </p:cNvPicPr>
+          <p:nvPr/>
+        </p:nvPicPr>
+        <p:blipFill>
+          <a:blip r:embed="rId5">
+            <a:extLst>
+              <a:ext uri="{28A0092B-C50C-407E-A947-70E740481C1C}">
+                <a14:useLocalDpi xmlns:a14="http://schemas.microsoft.com/office/drawing/2010/main" val="0"/>
+              </a:ext>
+            </a:extLst>
+          </a:blip>
+          <a:stretch>
+            <a:fillRect/>
+          </a:stretch>
+        </p:blipFill>
+        <p:spPr>
+          <a:xfrm>
+            <a:off x="1935020" y="1873453"/>
+            <a:ext cx="970136" cy="1269337"/>
+          </a:xfrm>
+          <a:prstGeom prst="rect">
+            <a:avLst/>
+          </a:prstGeom>
+        </p:spPr>
+      </p:pic>
+      <p:pic>
+        <p:nvPicPr>
+          <p:cNvPr id="48" name="Image 47"/>
+          <p:cNvPicPr>
+            <a:picLocks noChangeAspect="1"/>
+          </p:cNvPicPr>
+          <p:nvPr/>
+        </p:nvPicPr>
+        <p:blipFill>
+          <a:blip r:embed="rId4"/>
+          <a:stretch>
+            <a:fillRect/>
+          </a:stretch>
+        </p:blipFill>
+        <p:spPr>
+          <a:xfrm>
+            <a:off x="7214640" y="1953409"/>
+            <a:ext cx="227331" cy="240020"/>
+          </a:xfrm>
+          <a:prstGeom prst="rect">
+            <a:avLst/>
+          </a:prstGeom>
+        </p:spPr>
+      </p:pic>
+      <p:pic>
+        <p:nvPicPr>
+          <p:cNvPr id="49" name="Image 48" descr="OctoMan_Pos.png"/>
+          <p:cNvPicPr>
+            <a:picLocks noChangeAspect="1"/>
+          </p:cNvPicPr>
+          <p:nvPr/>
+        </p:nvPicPr>
+        <p:blipFill>
+          <a:blip r:embed="rId5">
+            <a:extLst>
+              <a:ext uri="{28A0092B-C50C-407E-A947-70E740481C1C}">
+                <a14:useLocalDpi xmlns:a14="http://schemas.microsoft.com/office/drawing/2010/main" val="0"/>
+              </a:ext>
+            </a:extLst>
+          </a:blip>
+          <a:stretch>
+            <a:fillRect/>
+          </a:stretch>
+        </p:blipFill>
+        <p:spPr>
+          <a:xfrm>
+            <a:off x="7184491" y="1571270"/>
+            <a:ext cx="287629" cy="376337"/>
+          </a:xfrm>
+          <a:prstGeom prst="rect">
+            <a:avLst/>
+          </a:prstGeom>
+        </p:spPr>
+      </p:pic>
+      <p:pic>
+        <p:nvPicPr>
+          <p:cNvPr id="50" name="Image 49"/>
+          <p:cNvPicPr>
+            <a:picLocks noChangeAspect="1"/>
+          </p:cNvPicPr>
+          <p:nvPr/>
+        </p:nvPicPr>
+        <p:blipFill>
+          <a:blip r:embed="rId4"/>
+          <a:stretch>
+            <a:fillRect/>
+          </a:stretch>
+        </p:blipFill>
+        <p:spPr>
+          <a:xfrm>
+            <a:off x="5055947" y="3805094"/>
+            <a:ext cx="227331" cy="240020"/>
+          </a:xfrm>
+          <a:prstGeom prst="rect">
+            <a:avLst/>
+          </a:prstGeom>
+        </p:spPr>
+      </p:pic>
+      <p:pic>
+        <p:nvPicPr>
+          <p:cNvPr id="51" name="Image 50" descr="OctoMan_Pos.png"/>
+          <p:cNvPicPr>
+            <a:picLocks noChangeAspect="1"/>
+          </p:cNvPicPr>
+          <p:nvPr/>
+        </p:nvPicPr>
+        <p:blipFill>
+          <a:blip r:embed="rId5">
+            <a:extLst>
+              <a:ext uri="{28A0092B-C50C-407E-A947-70E740481C1C}">
+                <a14:useLocalDpi xmlns:a14="http://schemas.microsoft.com/office/drawing/2010/main" val="0"/>
+              </a:ext>
+            </a:extLst>
+          </a:blip>
+          <a:stretch>
+            <a:fillRect/>
+          </a:stretch>
+        </p:blipFill>
+        <p:spPr>
+          <a:xfrm>
+            <a:off x="5025798" y="3422955"/>
+            <a:ext cx="287629" cy="376337"/>
+          </a:xfrm>
+          <a:prstGeom prst="rect">
+            <a:avLst/>
+          </a:prstGeom>
+        </p:spPr>
+      </p:pic>
+      <p:pic>
+        <p:nvPicPr>
+          <p:cNvPr id="52" name="Image 51"/>
+          <p:cNvPicPr>
+            <a:picLocks noChangeAspect="1"/>
+          </p:cNvPicPr>
+          <p:nvPr/>
+        </p:nvPicPr>
+        <p:blipFill>
+          <a:blip r:embed="rId4"/>
+          <a:stretch>
+            <a:fillRect/>
+          </a:stretch>
+        </p:blipFill>
+        <p:spPr>
+          <a:xfrm>
+            <a:off x="5956461" y="3741071"/>
+            <a:ext cx="227331" cy="240020"/>
+          </a:xfrm>
+          <a:prstGeom prst="rect">
+            <a:avLst/>
+          </a:prstGeom>
+        </p:spPr>
+      </p:pic>
+      <p:pic>
+        <p:nvPicPr>
+          <p:cNvPr id="53" name="Image 52" descr="OctoMan_Pos.png"/>
+          <p:cNvPicPr>
+            <a:picLocks noChangeAspect="1"/>
+          </p:cNvPicPr>
+          <p:nvPr/>
+        </p:nvPicPr>
+        <p:blipFill>
+          <a:blip r:embed="rId5">
+            <a:extLst>
+              <a:ext uri="{28A0092B-C50C-407E-A947-70E740481C1C}">
+                <a14:useLocalDpi xmlns:a14="http://schemas.microsoft.com/office/drawing/2010/main" val="0"/>
+              </a:ext>
+            </a:extLst>
+          </a:blip>
+          <a:stretch>
+            <a:fillRect/>
+          </a:stretch>
+        </p:blipFill>
+        <p:spPr>
+          <a:xfrm>
+            <a:off x="5926312" y="3358932"/>
+            <a:ext cx="287629" cy="376337"/>
+          </a:xfrm>
+          <a:prstGeom prst="rect">
+            <a:avLst/>
+          </a:prstGeom>
+        </p:spPr>
+      </p:pic>
+      <p:pic>
+        <p:nvPicPr>
+          <p:cNvPr id="54" name="Image 53"/>
+          <p:cNvPicPr>
+            <a:picLocks noChangeAspect="1"/>
+          </p:cNvPicPr>
+          <p:nvPr/>
+        </p:nvPicPr>
+        <p:blipFill>
+          <a:blip r:embed="rId4"/>
+          <a:stretch>
+            <a:fillRect/>
+          </a:stretch>
+        </p:blipFill>
+        <p:spPr>
+          <a:xfrm>
+            <a:off x="7456580" y="3093203"/>
+            <a:ext cx="335974" cy="354727"/>
+          </a:xfrm>
+          <a:prstGeom prst="rect">
+            <a:avLst/>
+          </a:prstGeom>
+        </p:spPr>
+      </p:pic>
+      <p:pic>
+        <p:nvPicPr>
+          <p:cNvPr id="55" name="Image 54" descr="OctoMan_Pos.png"/>
+          <p:cNvPicPr>
+            <a:picLocks noChangeAspect="1"/>
+          </p:cNvPicPr>
+          <p:nvPr/>
+        </p:nvPicPr>
+        <p:blipFill>
+          <a:blip r:embed="rId5">
+            <a:extLst>
+              <a:ext uri="{28A0092B-C50C-407E-A947-70E740481C1C}">
+                <a14:useLocalDpi xmlns:a14="http://schemas.microsoft.com/office/drawing/2010/main" val="0"/>
+              </a:ext>
+            </a:extLst>
+          </a:blip>
+          <a:stretch>
+            <a:fillRect/>
+          </a:stretch>
+        </p:blipFill>
+        <p:spPr>
+          <a:xfrm>
+            <a:off x="7424256" y="2506802"/>
+            <a:ext cx="425089" cy="556191"/>
+          </a:xfrm>
+          <a:prstGeom prst="rect">
+            <a:avLst/>
+          </a:prstGeom>
+        </p:spPr>
+      </p:pic>
     </p:spTree>
     <p:extLst>
       <p:ext uri="{BB962C8B-B14F-4D97-AF65-F5344CB8AC3E}">

</xml_diff>